<commit_message>
[Ajout ICONES + création page RECLAMATION] ajout des icônes panier + login + sablier pour page réclamation / + création de la page réclamation en fin de site
</commit_message>
<xml_diff>
--- a/Logo site.pptx
+++ b/Logo site.pptx
@@ -3405,8 +3405,8 @@
         </p:nvSpPr>
         <p:spPr>
           <a:xfrm>
-            <a:off x="6849533" y="3428999"/>
-            <a:ext cx="3826934" cy="736600"/>
+            <a:off x="4131733" y="4157133"/>
+            <a:ext cx="7984067" cy="1159934"/>
           </a:xfrm>
           <a:prstGeom prst="rect">
             <a:avLst/>
@@ -3438,7 +3438,7 @@
           <a:p>
             <a:pPr algn="ctr"/>
             <a:r>
-              <a:rPr lang="fr-FR" sz="4400" b="1" dirty="0" err="1">
+              <a:rPr lang="fr-FR" sz="8000" b="1" dirty="0" err="1">
                 <a:solidFill>
                   <a:srgbClr val="92D050"/>
                 </a:solidFill>
@@ -3454,7 +3454,7 @@
               </a:rPr>
               <a:t>plateFORME</a:t>
             </a:r>
-            <a:endParaRPr lang="fr-FR" sz="2000" b="1" dirty="0">
+            <a:endParaRPr lang="fr-FR" sz="4400" b="1" dirty="0">
               <a:solidFill>
                 <a:srgbClr val="92D050"/>
               </a:solidFill>

</xml_diff>